<commit_message>
add all these images back
</commit_message>
<xml_diff>
--- a/project3/Alansslides.pptx
+++ b/project3/Alansslides.pptx
@@ -3728,11 +3728,7 @@
           <a:p>
             <a:r>
               <a:rPr lang="en-US" dirty="0" smtClean="0"/>
-              <a:t>All comparisons </a:t>
-            </a:r>
-            <a:r>
-              <a:rPr lang="en-US" smtClean="0"/>
-              <a:t>were significant.</a:t>
+              <a:t>All comparisons were significant.</a:t>
             </a:r>
             <a:endParaRPr lang="en-US" dirty="0"/>
           </a:p>

</xml_diff>